<commit_message>
frequency modulation design and bad output after summation
</commit_message>
<xml_diff>
--- a/project proposal.pptx
+++ b/project proposal.pptx
@@ -6681,7 +6681,7 @@
           <a:p>
             <a:fld id="{2E3B9CBD-5119-44F6-8FC1-47D772CCD628}" type="datetimeFigureOut">
               <a:rPr lang="en-US" smtClean="0"/>
-              <a:t>4/4/2021</a:t>
+              <a:t>5/19/2021</a:t>
             </a:fld>
             <a:endParaRPr lang="en-US"/>
           </a:p>
@@ -6852,7 +6852,7 @@
           <a:p>
             <a:fld id="{2E3B9CBD-5119-44F6-8FC1-47D772CCD628}" type="datetimeFigureOut">
               <a:rPr lang="en-US" smtClean="0"/>
-              <a:t>4/4/2021</a:t>
+              <a:t>5/19/2021</a:t>
             </a:fld>
             <a:endParaRPr lang="en-US"/>
           </a:p>
@@ -7033,7 +7033,7 @@
           <a:p>
             <a:fld id="{2E3B9CBD-5119-44F6-8FC1-47D772CCD628}" type="datetimeFigureOut">
               <a:rPr lang="en-US" smtClean="0"/>
-              <a:t>4/4/2021</a:t>
+              <a:t>5/19/2021</a:t>
             </a:fld>
             <a:endParaRPr lang="en-US"/>
           </a:p>
@@ -7447,7 +7447,7 @@
           <a:p>
             <a:fld id="{2E3B9CBD-5119-44F6-8FC1-47D772CCD628}" type="datetimeFigureOut">
               <a:rPr lang="en-US" smtClean="0"/>
-              <a:t>4/4/2021</a:t>
+              <a:t>5/19/2021</a:t>
             </a:fld>
             <a:endParaRPr lang="en-US"/>
           </a:p>
@@ -7680,7 +7680,7 @@
           <a:p>
             <a:fld id="{2E3B9CBD-5119-44F6-8FC1-47D772CCD628}" type="datetimeFigureOut">
               <a:rPr lang="en-US" smtClean="0"/>
-              <a:t>4/4/2021</a:t>
+              <a:t>5/19/2021</a:t>
             </a:fld>
             <a:endParaRPr lang="en-US"/>
           </a:p>
@@ -8048,7 +8048,7 @@
           <a:p>
             <a:fld id="{2E3B9CBD-5119-44F6-8FC1-47D772CCD628}" type="datetimeFigureOut">
               <a:rPr lang="en-US" smtClean="0"/>
-              <a:t>4/4/2021</a:t>
+              <a:t>5/19/2021</a:t>
             </a:fld>
             <a:endParaRPr lang="en-US"/>
           </a:p>
@@ -8167,7 +8167,7 @@
           <a:p>
             <a:fld id="{2E3B9CBD-5119-44F6-8FC1-47D772CCD628}" type="datetimeFigureOut">
               <a:rPr lang="en-US" smtClean="0"/>
-              <a:t>4/4/2021</a:t>
+              <a:t>5/19/2021</a:t>
             </a:fld>
             <a:endParaRPr lang="en-US"/>
           </a:p>
@@ -8263,7 +8263,7 @@
           <a:p>
             <a:fld id="{2E3B9CBD-5119-44F6-8FC1-47D772CCD628}" type="datetimeFigureOut">
               <a:rPr lang="en-US" smtClean="0"/>
-              <a:t>4/4/2021</a:t>
+              <a:t>5/19/2021</a:t>
             </a:fld>
             <a:endParaRPr lang="en-US"/>
           </a:p>
@@ -8541,7 +8541,7 @@
           <a:p>
             <a:fld id="{2E3B9CBD-5119-44F6-8FC1-47D772CCD628}" type="datetimeFigureOut">
               <a:rPr lang="en-US" smtClean="0"/>
-              <a:t>4/4/2021</a:t>
+              <a:t>5/19/2021</a:t>
             </a:fld>
             <a:endParaRPr lang="en-US"/>
           </a:p>
@@ -8795,7 +8795,7 @@
           <a:p>
             <a:fld id="{2E3B9CBD-5119-44F6-8FC1-47D772CCD628}" type="datetimeFigureOut">
               <a:rPr lang="en-US" smtClean="0"/>
-              <a:t>4/4/2021</a:t>
+              <a:t>5/19/2021</a:t>
             </a:fld>
             <a:endParaRPr lang="en-US"/>
           </a:p>
@@ -9009,7 +9009,7 @@
           <a:p>
             <a:fld id="{2E3B9CBD-5119-44F6-8FC1-47D772CCD628}" type="datetimeFigureOut">
               <a:rPr lang="en-US" smtClean="0"/>
-              <a:t>4/4/2021</a:t>
+              <a:t>5/19/2021</a:t>
             </a:fld>
             <a:endParaRPr lang="en-US"/>
           </a:p>
@@ -10630,7 +10630,7 @@
           <p:cNvPr id="5" name="Rectangle 4">
             <a:extLst>
               <a:ext uri="{FF2B5EF4-FFF2-40B4-BE49-F238E27FC236}">
-                <a16:creationId xmlns="" xmlns:a16="http://schemas.microsoft.com/office/drawing/2014/main" id="{D6B20F00-9B21-4FC4-9CD5-EA18495E8BB5}"/>
+                <a16:creationId xmlns:a16="http://schemas.microsoft.com/office/drawing/2014/main" xmlns="" id="{D6B20F00-9B21-4FC4-9CD5-EA18495E8BB5}"/>
               </a:ext>
             </a:extLst>
           </p:cNvPr>
@@ -10677,7 +10677,7 @@
           <p:cNvPr id="6" name="Rectangle 5">
             <a:extLst>
               <a:ext uri="{FF2B5EF4-FFF2-40B4-BE49-F238E27FC236}">
-                <a16:creationId xmlns="" xmlns:a16="http://schemas.microsoft.com/office/drawing/2014/main" id="{7FF603A0-EBE0-44E7-A4FF-73F4FD5BE02B}"/>
+                <a16:creationId xmlns:a16="http://schemas.microsoft.com/office/drawing/2014/main" xmlns="" id="{7FF603A0-EBE0-44E7-A4FF-73F4FD5BE02B}"/>
               </a:ext>
             </a:extLst>
           </p:cNvPr>
@@ -10724,7 +10724,7 @@
           <p:cNvPr id="7" name="Rectangle 6">
             <a:extLst>
               <a:ext uri="{FF2B5EF4-FFF2-40B4-BE49-F238E27FC236}">
-                <a16:creationId xmlns="" xmlns:a16="http://schemas.microsoft.com/office/drawing/2014/main" id="{18D8B9AC-7AEC-4289-988A-0B7F94715F07}"/>
+                <a16:creationId xmlns:a16="http://schemas.microsoft.com/office/drawing/2014/main" xmlns="" id="{18D8B9AC-7AEC-4289-988A-0B7F94715F07}"/>
               </a:ext>
             </a:extLst>
           </p:cNvPr>
@@ -10771,7 +10771,7 @@
           <p:cNvPr id="8" name="Straight Arrow Connector 7">
             <a:extLst>
               <a:ext uri="{FF2B5EF4-FFF2-40B4-BE49-F238E27FC236}">
-                <a16:creationId xmlns="" xmlns:a16="http://schemas.microsoft.com/office/drawing/2014/main" id="{18AA57BD-B7DA-411D-BF7C-F73E6D2B5ACD}"/>
+                <a16:creationId xmlns:a16="http://schemas.microsoft.com/office/drawing/2014/main" xmlns="" id="{18AA57BD-B7DA-411D-BF7C-F73E6D2B5ACD}"/>
               </a:ext>
             </a:extLst>
           </p:cNvPr>
@@ -10812,7 +10812,7 @@
           <p:cNvPr id="9" name="Rectangle 8">
             <a:extLst>
               <a:ext uri="{FF2B5EF4-FFF2-40B4-BE49-F238E27FC236}">
-                <a16:creationId xmlns="" xmlns:a16="http://schemas.microsoft.com/office/drawing/2014/main" id="{F1B87839-6A28-44F6-9D6C-3261368DE820}"/>
+                <a16:creationId xmlns:a16="http://schemas.microsoft.com/office/drawing/2014/main" xmlns="" id="{F1B87839-6A28-44F6-9D6C-3261368DE820}"/>
               </a:ext>
             </a:extLst>
           </p:cNvPr>
@@ -10859,7 +10859,7 @@
           <p:cNvPr id="10" name="Straight Arrow Connector 9">
             <a:extLst>
               <a:ext uri="{FF2B5EF4-FFF2-40B4-BE49-F238E27FC236}">
-                <a16:creationId xmlns="" xmlns:a16="http://schemas.microsoft.com/office/drawing/2014/main" id="{58179B1F-F1CF-4C66-934C-FFEA538CDE34}"/>
+                <a16:creationId xmlns:a16="http://schemas.microsoft.com/office/drawing/2014/main" xmlns="" id="{58179B1F-F1CF-4C66-934C-FFEA538CDE34}"/>
               </a:ext>
             </a:extLst>
           </p:cNvPr>
@@ -10902,7 +10902,7 @@
           <p:cNvPr id="11" name="Straight Arrow Connector 10">
             <a:extLst>
               <a:ext uri="{FF2B5EF4-FFF2-40B4-BE49-F238E27FC236}">
-                <a16:creationId xmlns="" xmlns:a16="http://schemas.microsoft.com/office/drawing/2014/main" id="{C39F00F5-F8F4-4105-9B1C-3A7B02FDCB83}"/>
+                <a16:creationId xmlns:a16="http://schemas.microsoft.com/office/drawing/2014/main" xmlns="" id="{C39F00F5-F8F4-4105-9B1C-3A7B02FDCB83}"/>
               </a:ext>
             </a:extLst>
           </p:cNvPr>
@@ -10943,7 +10943,7 @@
           <p:cNvPr id="12" name="Rectangle 11">
             <a:extLst>
               <a:ext uri="{FF2B5EF4-FFF2-40B4-BE49-F238E27FC236}">
-                <a16:creationId xmlns="" xmlns:a16="http://schemas.microsoft.com/office/drawing/2014/main" id="{0C4DDC02-B069-46AB-9E85-BFF3DFA7F8AA}"/>
+                <a16:creationId xmlns:a16="http://schemas.microsoft.com/office/drawing/2014/main" xmlns="" id="{0C4DDC02-B069-46AB-9E85-BFF3DFA7F8AA}"/>
               </a:ext>
             </a:extLst>
           </p:cNvPr>
@@ -10990,7 +10990,7 @@
           <p:cNvPr id="13" name="Rectangle 12">
             <a:extLst>
               <a:ext uri="{FF2B5EF4-FFF2-40B4-BE49-F238E27FC236}">
-                <a16:creationId xmlns="" xmlns:a16="http://schemas.microsoft.com/office/drawing/2014/main" id="{2DAC011A-B04A-420A-B0B0-C5A62B88DD9B}"/>
+                <a16:creationId xmlns:a16="http://schemas.microsoft.com/office/drawing/2014/main" xmlns="" id="{2DAC011A-B04A-420A-B0B0-C5A62B88DD9B}"/>
               </a:ext>
             </a:extLst>
           </p:cNvPr>
@@ -11037,7 +11037,7 @@
           <p:cNvPr id="14" name="Rectangle 13">
             <a:extLst>
               <a:ext uri="{FF2B5EF4-FFF2-40B4-BE49-F238E27FC236}">
-                <a16:creationId xmlns="" xmlns:a16="http://schemas.microsoft.com/office/drawing/2014/main" id="{77EBF251-B120-4BA5-85E2-8DE41990CC1A}"/>
+                <a16:creationId xmlns:a16="http://schemas.microsoft.com/office/drawing/2014/main" xmlns="" id="{77EBF251-B120-4BA5-85E2-8DE41990CC1A}"/>
               </a:ext>
             </a:extLst>
           </p:cNvPr>
@@ -11084,7 +11084,7 @@
           <p:cNvPr id="15" name="Rectangle 14">
             <a:extLst>
               <a:ext uri="{FF2B5EF4-FFF2-40B4-BE49-F238E27FC236}">
-                <a16:creationId xmlns="" xmlns:a16="http://schemas.microsoft.com/office/drawing/2014/main" id="{68291E75-4BC9-4F70-A679-3444071518B9}"/>
+                <a16:creationId xmlns:a16="http://schemas.microsoft.com/office/drawing/2014/main" xmlns="" id="{68291E75-4BC9-4F70-A679-3444071518B9}"/>
               </a:ext>
             </a:extLst>
           </p:cNvPr>
@@ -11136,7 +11136,7 @@
           <p:cNvPr id="16" name="Straight Arrow Connector 15">
             <a:extLst>
               <a:ext uri="{FF2B5EF4-FFF2-40B4-BE49-F238E27FC236}">
-                <a16:creationId xmlns="" xmlns:a16="http://schemas.microsoft.com/office/drawing/2014/main" id="{1A0B6155-30D7-4507-8930-FED4B4A04249}"/>
+                <a16:creationId xmlns:a16="http://schemas.microsoft.com/office/drawing/2014/main" xmlns="" id="{1A0B6155-30D7-4507-8930-FED4B4A04249}"/>
               </a:ext>
             </a:extLst>
           </p:cNvPr>
@@ -11179,7 +11179,7 @@
           <p:cNvPr id="17" name="Straight Arrow Connector 16">
             <a:extLst>
               <a:ext uri="{FF2B5EF4-FFF2-40B4-BE49-F238E27FC236}">
-                <a16:creationId xmlns="" xmlns:a16="http://schemas.microsoft.com/office/drawing/2014/main" id="{751E78B9-25ED-4823-A20A-714AD569DBD1}"/>
+                <a16:creationId xmlns:a16="http://schemas.microsoft.com/office/drawing/2014/main" xmlns="" id="{751E78B9-25ED-4823-A20A-714AD569DBD1}"/>
               </a:ext>
             </a:extLst>
           </p:cNvPr>
@@ -11220,7 +11220,7 @@
           <p:cNvPr id="18" name="Rectangle 17">
             <a:extLst>
               <a:ext uri="{FF2B5EF4-FFF2-40B4-BE49-F238E27FC236}">
-                <a16:creationId xmlns="" xmlns:a16="http://schemas.microsoft.com/office/drawing/2014/main" id="{27B9BBF5-8579-42B7-91AA-0A05F4DF4DBD}"/>
+                <a16:creationId xmlns:a16="http://schemas.microsoft.com/office/drawing/2014/main" xmlns="" id="{27B9BBF5-8579-42B7-91AA-0A05F4DF4DBD}"/>
               </a:ext>
             </a:extLst>
           </p:cNvPr>
@@ -11267,7 +11267,7 @@
           <p:cNvPr id="19" name="Straight Arrow Connector 18">
             <a:extLst>
               <a:ext uri="{FF2B5EF4-FFF2-40B4-BE49-F238E27FC236}">
-                <a16:creationId xmlns="" xmlns:a16="http://schemas.microsoft.com/office/drawing/2014/main" id="{231E1975-7E63-408B-8A4F-D3EC84965B2B}"/>
+                <a16:creationId xmlns:a16="http://schemas.microsoft.com/office/drawing/2014/main" xmlns="" id="{231E1975-7E63-408B-8A4F-D3EC84965B2B}"/>
               </a:ext>
             </a:extLst>
           </p:cNvPr>
@@ -11308,7 +11308,7 @@
           <p:cNvPr id="20" name="Rectangle 19">
             <a:extLst>
               <a:ext uri="{FF2B5EF4-FFF2-40B4-BE49-F238E27FC236}">
-                <a16:creationId xmlns="" xmlns:a16="http://schemas.microsoft.com/office/drawing/2014/main" id="{646EF85B-CB0C-4579-B908-49A6D1D3A57C}"/>
+                <a16:creationId xmlns:a16="http://schemas.microsoft.com/office/drawing/2014/main" xmlns="" id="{646EF85B-CB0C-4579-B908-49A6D1D3A57C}"/>
               </a:ext>
             </a:extLst>
           </p:cNvPr>
@@ -11355,7 +11355,7 @@
           <p:cNvPr id="21" name="Straight Arrow Connector 20">
             <a:extLst>
               <a:ext uri="{FF2B5EF4-FFF2-40B4-BE49-F238E27FC236}">
-                <a16:creationId xmlns="" xmlns:a16="http://schemas.microsoft.com/office/drawing/2014/main" id="{401739D0-BCC8-40DE-878E-890E3F5EF704}"/>
+                <a16:creationId xmlns:a16="http://schemas.microsoft.com/office/drawing/2014/main" xmlns="" id="{401739D0-BCC8-40DE-878E-890E3F5EF704}"/>
               </a:ext>
             </a:extLst>
           </p:cNvPr>
@@ -11396,7 +11396,7 @@
           <p:cNvPr id="22" name="Straight Arrow Connector 21">
             <a:extLst>
               <a:ext uri="{FF2B5EF4-FFF2-40B4-BE49-F238E27FC236}">
-                <a16:creationId xmlns="" xmlns:a16="http://schemas.microsoft.com/office/drawing/2014/main" id="{63B0ECA3-FFE8-4817-B9F4-2A89AA6A1417}"/>
+                <a16:creationId xmlns:a16="http://schemas.microsoft.com/office/drawing/2014/main" xmlns="" id="{63B0ECA3-FFE8-4817-B9F4-2A89AA6A1417}"/>
               </a:ext>
             </a:extLst>
           </p:cNvPr>
@@ -11437,7 +11437,7 @@
           <p:cNvPr id="23" name="Straight Arrow Connector 22">
             <a:extLst>
               <a:ext uri="{FF2B5EF4-FFF2-40B4-BE49-F238E27FC236}">
-                <a16:creationId xmlns="" xmlns:a16="http://schemas.microsoft.com/office/drawing/2014/main" id="{55603513-E6FF-496E-A372-152B1E45BB14}"/>
+                <a16:creationId xmlns:a16="http://schemas.microsoft.com/office/drawing/2014/main" xmlns="" id="{55603513-E6FF-496E-A372-152B1E45BB14}"/>
               </a:ext>
             </a:extLst>
           </p:cNvPr>
@@ -11537,11 +11537,7 @@
           <a:p>
             <a:r>
               <a:rPr lang="en-US" sz="800" dirty="0" smtClean="0"/>
-              <a:t>Carrier </a:t>
-            </a:r>
-            <a:r>
-              <a:rPr lang="en-US" sz="800" dirty="0" smtClean="0"/>
-              <a:t>2</a:t>
+              <a:t>Carrier 2</a:t>
             </a:r>
           </a:p>
           <a:p>
@@ -11582,11 +11578,7 @@
           <a:p>
             <a:r>
               <a:rPr lang="en-US" dirty="0" smtClean="0"/>
-              <a:t>Carrier </a:t>
-            </a:r>
-            <a:r>
-              <a:rPr lang="en-US" dirty="0" smtClean="0"/>
-              <a:t>3</a:t>
+              <a:t>Carrier 3</a:t>
             </a:r>
           </a:p>
           <a:p>

</xml_diff>